<commit_message>
presentation shell updated references
</commit_message>
<xml_diff>
--- a/Presentation/ProjectOne Presentation.pptx
+++ b/Presentation/ProjectOne Presentation.pptx
@@ -7920,7 +7920,9 @@
         </p:nvSpPr>
         <p:spPr/>
         <p:txBody>
-          <a:bodyPr/>
+          <a:bodyPr>
+            <a:normAutofit fontScale="92500" lnSpcReduction="20000"/>
+          </a:bodyPr>
           <a:lstStyle/>
           <a:p>
             <a:r>
@@ -7975,6 +7977,20 @@
               <a:rPr lang="en-US" dirty="0"/>
               <a:t>National Highway Traffic Safety Administration (API)</a:t>
             </a:r>
+          </a:p>
+          <a:p>
+            <a:r>
+              <a:rPr lang="en-US" dirty="0" err="1"/>
+              <a:t>Everyvine</a:t>
+            </a:r>
+            <a:endParaRPr lang="en-US" dirty="0"/>
+          </a:p>
+          <a:p>
+            <a:r>
+              <a:rPr lang="en-US" dirty="0" err="1"/>
+              <a:t>VinePair</a:t>
+            </a:r>
+            <a:endParaRPr lang="en-US" dirty="0"/>
           </a:p>
         </p:txBody>
       </p:sp>

</xml_diff>

<commit_message>
added additional plots for crashes vs. consumption
</commit_message>
<xml_diff>
--- a/Presentation/ProjectOne Presentation.pptx
+++ b/Presentation/ProjectOne Presentation.pptx
@@ -4024,7 +4024,7 @@
           <a:p>
             <a:fld id="{ED291B17-9318-49DB-B28B-6E5994AE9581}" type="datetime1">
               <a:rPr lang="en-US" smtClean="0"/>
-              <a:t>11/21/2019</a:t>
+              <a:t>11/22/2019</a:t>
             </a:fld>
             <a:endParaRPr lang="en-US" dirty="0"/>
           </a:p>
@@ -4227,7 +4227,7 @@
           <a:p>
             <a:fld id="{2CED4963-E985-44C4-B8C4-FDD613B7C2F8}" type="datetime1">
               <a:rPr lang="en-US" smtClean="0"/>
-              <a:t>11/21/2019</a:t>
+              <a:t>11/22/2019</a:t>
             </a:fld>
             <a:endParaRPr lang="en-US" dirty="0"/>
           </a:p>
@@ -4589,7 +4589,7 @@
           <a:p>
             <a:fld id="{ED291B17-9318-49DB-B28B-6E5994AE9581}" type="datetime1">
               <a:rPr lang="en-US" smtClean="0"/>
-              <a:t>11/21/2019</a:t>
+              <a:t>11/22/2019</a:t>
             </a:fld>
             <a:endParaRPr lang="en-US" dirty="0"/>
           </a:p>
@@ -4787,7 +4787,7 @@
           <a:p>
             <a:fld id="{78DD82B9-B8EE-4375-B6FF-88FA6ABB15D9}" type="datetime1">
               <a:rPr lang="en-US" smtClean="0"/>
-              <a:t>11/21/2019</a:t>
+              <a:t>11/22/2019</a:t>
             </a:fld>
             <a:endParaRPr lang="en-US" dirty="0"/>
           </a:p>
@@ -5099,7 +5099,7 @@
           <a:p>
             <a:fld id="{B2497495-0637-405E-AE64-5CC7506D51F5}" type="datetime1">
               <a:rPr lang="en-US" smtClean="0"/>
-              <a:t>11/21/2019</a:t>
+              <a:t>11/22/2019</a:t>
             </a:fld>
             <a:endParaRPr lang="en-US" dirty="0"/>
           </a:p>
@@ -5352,7 +5352,7 @@
           <a:p>
             <a:fld id="{7BFFD690-9426-415D-8B65-26881E07B2D4}" type="datetime1">
               <a:rPr lang="en-US" smtClean="0"/>
-              <a:t>11/21/2019</a:t>
+              <a:t>11/22/2019</a:t>
             </a:fld>
             <a:endParaRPr lang="en-US" dirty="0"/>
           </a:p>
@@ -5774,7 +5774,7 @@
           <a:p>
             <a:fld id="{04C4989A-474C-40DE-95B9-011C28B71673}" type="datetime1">
               <a:rPr lang="en-US" smtClean="0"/>
-              <a:t>11/21/2019</a:t>
+              <a:t>11/22/2019</a:t>
             </a:fld>
             <a:endParaRPr lang="en-US" dirty="0"/>
           </a:p>
@@ -5897,7 +5897,7 @@
           <a:p>
             <a:fld id="{5DB4ED54-5B5E-4A04-93D3-5772E3CE3818}" type="datetime1">
               <a:rPr lang="en-US" smtClean="0"/>
-              <a:t>11/21/2019</a:t>
+              <a:t>11/22/2019</a:t>
             </a:fld>
             <a:endParaRPr lang="en-US" dirty="0"/>
           </a:p>
@@ -5992,7 +5992,7 @@
           <a:p>
             <a:fld id="{4EDE50D6-574B-40AF-946F-D52A04ADE379}" type="datetime1">
               <a:rPr lang="en-US" smtClean="0"/>
-              <a:t>11/21/2019</a:t>
+              <a:t>11/22/2019</a:t>
             </a:fld>
             <a:endParaRPr lang="en-US" dirty="0"/>
           </a:p>
@@ -6369,7 +6369,7 @@
           <a:p>
             <a:fld id="{D82884F1-FFEA-405F-9602-3DCA865EDA4E}" type="datetime1">
               <a:rPr lang="en-US" smtClean="0"/>
-              <a:t>11/21/2019</a:t>
+              <a:t>11/22/2019</a:t>
             </a:fld>
             <a:endParaRPr lang="en-US" dirty="0"/>
           </a:p>
@@ -6662,7 +6662,7 @@
           <a:p>
             <a:fld id="{7E18DB4A-8810-4A10-AD5C-D5E2C667F5B3}" type="datetime1">
               <a:rPr lang="en-US" smtClean="0"/>
-              <a:t>11/21/2019</a:t>
+              <a:t>11/22/2019</a:t>
             </a:fld>
             <a:endParaRPr lang="en-US" dirty="0"/>
           </a:p>
@@ -6877,7 +6877,7 @@
           <a:p>
             <a:fld id="{ED291B17-9318-49DB-B28B-6E5994AE9581}" type="datetime1">
               <a:rPr lang="en-US" smtClean="0"/>
-              <a:t>11/21/2019</a:t>
+              <a:t>11/22/2019</a:t>
             </a:fld>
             <a:endParaRPr lang="en-US" dirty="0"/>
           </a:p>
@@ -7600,7 +7600,7 @@
           </a:xfrm>
         </p:spPr>
         <p:txBody>
-          <a:bodyPr>
+          <a:bodyPr anchor="t">
             <a:normAutofit/>
           </a:bodyPr>
           <a:lstStyle/>
@@ -8076,7 +8076,7 @@
         </p:nvSpPr>
         <p:spPr/>
         <p:txBody>
-          <a:bodyPr/>
+          <a:bodyPr anchor="t"/>
           <a:lstStyle/>
           <a:p>
             <a:r>
@@ -8159,7 +8159,7 @@
         </p:nvSpPr>
         <p:spPr/>
         <p:txBody>
-          <a:bodyPr/>
+          <a:bodyPr anchor="t"/>
           <a:lstStyle/>
           <a:p>
             <a:r>
@@ -8242,7 +8242,7 @@
         </p:nvSpPr>
         <p:spPr/>
         <p:txBody>
-          <a:bodyPr/>
+          <a:bodyPr anchor="t"/>
           <a:lstStyle/>
           <a:p>
             <a:r>
@@ -8329,9 +8329,14 @@
             <p:ph type="title"/>
           </p:nvPr>
         </p:nvSpPr>
-        <p:spPr/>
+        <p:spPr>
+          <a:xfrm>
+            <a:off x="581192" y="702156"/>
+            <a:ext cx="11029616" cy="1188720"/>
+          </a:xfrm>
+        </p:spPr>
         <p:txBody>
-          <a:bodyPr/>
+          <a:bodyPr anchor="t"/>
           <a:lstStyle/>
           <a:p>
             <a:r>
@@ -8414,7 +8419,7 @@
         </p:nvSpPr>
         <p:spPr/>
         <p:txBody>
-          <a:bodyPr/>
+          <a:bodyPr anchor="t"/>
           <a:lstStyle/>
           <a:p>
             <a:r>
@@ -8445,7 +8450,7 @@
           <a:bodyPr/>
           <a:lstStyle/>
           <a:p>
-            <a:endParaRPr lang="en-US"/>
+            <a:endParaRPr lang="en-US" dirty="0"/>
           </a:p>
         </p:txBody>
       </p:sp>
@@ -8497,7 +8502,7 @@
         </p:nvSpPr>
         <p:spPr/>
         <p:txBody>
-          <a:bodyPr/>
+          <a:bodyPr anchor="t"/>
           <a:lstStyle/>
           <a:p>
             <a:r>
@@ -8578,40 +8583,45 @@
             <p:ph type="title"/>
           </p:nvPr>
         </p:nvSpPr>
+        <p:spPr>
+          <a:xfrm>
+            <a:off x="581192" y="702156"/>
+            <a:ext cx="11029616" cy="1188720"/>
+          </a:xfrm>
+        </p:spPr>
+        <p:txBody>
+          <a:bodyPr anchor="t"/>
+          <a:lstStyle/>
+          <a:p>
+            <a:r>
+              <a:rPr lang="en-US" dirty="0"/>
+              <a:t>Crash FATALITY rates</a:t>
+            </a:r>
+          </a:p>
+        </p:txBody>
+      </p:sp>
+      <p:sp>
+        <p:nvSpPr>
+          <p:cNvPr id="13" name="Content Placeholder 12">
+            <a:extLst>
+              <a:ext uri="{FF2B5EF4-FFF2-40B4-BE49-F238E27FC236}">
+                <a16:creationId xmlns:a16="http://schemas.microsoft.com/office/drawing/2014/main" id="{FC1DDF83-C24A-4AB6-80C4-261B185CE2DB}"/>
+              </a:ext>
+            </a:extLst>
+          </p:cNvPr>
+          <p:cNvSpPr>
+            <a:spLocks noGrp="1"/>
+          </p:cNvSpPr>
+          <p:nvPr>
+            <p:ph idx="1"/>
+          </p:nvPr>
+        </p:nvSpPr>
         <p:spPr/>
         <p:txBody>
           <a:bodyPr/>
           <a:lstStyle/>
           <a:p>
-            <a:r>
-              <a:rPr lang="en-US" dirty="0"/>
-              <a:t>crash rates</a:t>
-            </a:r>
-          </a:p>
-        </p:txBody>
-      </p:sp>
-      <p:sp>
-        <p:nvSpPr>
-          <p:cNvPr id="3" name="Content Placeholder 2">
-            <a:extLst>
-              <a:ext uri="{FF2B5EF4-FFF2-40B4-BE49-F238E27FC236}">
-                <a16:creationId xmlns:a16="http://schemas.microsoft.com/office/drawing/2014/main" id="{F360DE0A-E8ED-4A6D-84CE-7782113F379C}"/>
-              </a:ext>
-            </a:extLst>
-          </p:cNvPr>
-          <p:cNvSpPr>
-            <a:spLocks noGrp="1"/>
-          </p:cNvSpPr>
-          <p:nvPr>
-            <p:ph idx="1"/>
-          </p:nvPr>
-        </p:nvSpPr>
-        <p:spPr/>
-        <p:txBody>
-          <a:bodyPr/>
-          <a:lstStyle/>
-          <a:p>
-            <a:endParaRPr lang="en-US"/>
+            <a:endParaRPr lang="en-US" dirty="0"/>
           </a:p>
         </p:txBody>
       </p:sp>
@@ -8663,7 +8673,7 @@
         </p:nvSpPr>
         <p:spPr/>
         <p:txBody>
-          <a:bodyPr/>
+          <a:bodyPr anchor="t"/>
           <a:lstStyle/>
           <a:p>
             <a:r>
@@ -8746,7 +8756,7 @@
         </p:nvSpPr>
         <p:spPr/>
         <p:txBody>
-          <a:bodyPr/>
+          <a:bodyPr anchor="t"/>
           <a:lstStyle/>
           <a:p>
             <a:r>
@@ -8829,7 +8839,7 @@
         </p:nvSpPr>
         <p:spPr/>
         <p:txBody>
-          <a:bodyPr/>
+          <a:bodyPr anchor="t"/>
           <a:lstStyle/>
           <a:p>
             <a:r>

</xml_diff>

<commit_message>
updated presentation with LC and RM additions
</commit_message>
<xml_diff>
--- a/Presentation/ProjectOne Presentation.pptx
+++ b/Presentation/ProjectOne Presentation.pptx
@@ -6,17 +6,18 @@
   </p:sldMasterIdLst>
   <p:sldIdLst>
     <p:sldId id="257" r:id="rId2"/>
-    <p:sldId id="258" r:id="rId3"/>
-    <p:sldId id="259" r:id="rId4"/>
-    <p:sldId id="260" r:id="rId5"/>
-    <p:sldId id="261" r:id="rId6"/>
-    <p:sldId id="262" r:id="rId7"/>
-    <p:sldId id="263" r:id="rId8"/>
-    <p:sldId id="264" r:id="rId9"/>
-    <p:sldId id="265" r:id="rId10"/>
-    <p:sldId id="266" r:id="rId11"/>
-    <p:sldId id="268" r:id="rId12"/>
-    <p:sldId id="267" r:id="rId13"/>
+    <p:sldId id="270" r:id="rId3"/>
+    <p:sldId id="258" r:id="rId4"/>
+    <p:sldId id="269" r:id="rId5"/>
+    <p:sldId id="271" r:id="rId6"/>
+    <p:sldId id="261" r:id="rId7"/>
+    <p:sldId id="262" r:id="rId8"/>
+    <p:sldId id="272" r:id="rId9"/>
+    <p:sldId id="264" r:id="rId10"/>
+    <p:sldId id="265" r:id="rId11"/>
+    <p:sldId id="266" r:id="rId12"/>
+    <p:sldId id="273" r:id="rId13"/>
+    <p:sldId id="274" r:id="rId14"/>
   </p:sldIdLst>
   <p:sldSz cx="12192000" cy="6858000"/>
   <p:notesSz cx="6858000" cy="9144000"/>
@@ -7876,10 +7877,10 @@
       </p:grpSpPr>
       <p:sp>
         <p:nvSpPr>
-          <p:cNvPr id="4" name="Title 3">
+          <p:cNvPr id="7" name="Title 6">
             <a:extLst>
               <a:ext uri="{FF2B5EF4-FFF2-40B4-BE49-F238E27FC236}">
-                <a16:creationId xmlns:a16="http://schemas.microsoft.com/office/drawing/2014/main" id="{2AB37ED5-3491-430E-80AE-1EB48CA271D2}"/>
+                <a16:creationId xmlns:a16="http://schemas.microsoft.com/office/drawing/2014/main" id="{D4B7B706-54E9-4555-844A-65D6DA5534BD}"/>
               </a:ext>
             </a:extLst>
           </p:cNvPr>
@@ -7892,22 +7893,22 @@
         </p:nvSpPr>
         <p:spPr/>
         <p:txBody>
-          <a:bodyPr/>
+          <a:bodyPr anchor="t"/>
           <a:lstStyle/>
           <a:p>
             <a:r>
               <a:rPr lang="en-US" dirty="0"/>
-              <a:t>references</a:t>
+              <a:t>Appendix &amp; references</a:t>
             </a:r>
           </a:p>
         </p:txBody>
       </p:sp>
       <p:sp>
         <p:nvSpPr>
-          <p:cNvPr id="7" name="Text Placeholder 6">
+          <p:cNvPr id="8" name="Text Placeholder 7">
             <a:extLst>
               <a:ext uri="{FF2B5EF4-FFF2-40B4-BE49-F238E27FC236}">
-                <a16:creationId xmlns:a16="http://schemas.microsoft.com/office/drawing/2014/main" id="{8C52ACDC-83BB-415A-A11E-E704EFEC3A3D}"/>
+                <a16:creationId xmlns:a16="http://schemas.microsoft.com/office/drawing/2014/main" id="{D1FB7F40-7669-4C05-B313-AB3C41751B01}"/>
               </a:ext>
             </a:extLst>
           </p:cNvPr>
@@ -7915,99 +7916,7 @@
             <a:spLocks noGrp="1"/>
           </p:cNvSpPr>
           <p:nvPr>
-            <p:ph idx="1"/>
-          </p:nvPr>
-        </p:nvSpPr>
-        <p:spPr/>
-        <p:txBody>
-          <a:bodyPr>
-            <a:normAutofit fontScale="92500" lnSpcReduction="20000"/>
-          </a:bodyPr>
-          <a:lstStyle/>
-          <a:p>
-            <a:r>
-              <a:rPr lang="en-US" dirty="0"/>
-              <a:t>Wine &amp; Vines</a:t>
-            </a:r>
-          </a:p>
-          <a:p>
-            <a:r>
-              <a:rPr lang="en-US" dirty="0"/>
-              <a:t>US Census Bureau</a:t>
-            </a:r>
-          </a:p>
-          <a:p>
-            <a:r>
-              <a:rPr lang="en-US" dirty="0"/>
-              <a:t>Department of the Treasury, Alcohol, Tobacco Tax and Trade Bureau</a:t>
-            </a:r>
-          </a:p>
-          <a:p>
-            <a:r>
-              <a:rPr lang="en-US" dirty="0"/>
-              <a:t>National Institute on Alcohol Abuse and Alcoholism</a:t>
-            </a:r>
-          </a:p>
-          <a:p>
-            <a:r>
-              <a:rPr lang="en-US" dirty="0"/>
-              <a:t>Bureau of Economic Analysis</a:t>
-            </a:r>
-          </a:p>
-          <a:p>
-            <a:r>
-              <a:rPr lang="en-US" dirty="0"/>
-              <a:t>Centers for Disease Control and Prevention</a:t>
-            </a:r>
-          </a:p>
-          <a:p>
-            <a:r>
-              <a:rPr lang="en-US" dirty="0"/>
-              <a:t>Kaiser Family Foundation</a:t>
-            </a:r>
-          </a:p>
-          <a:p>
-            <a:r>
-              <a:rPr lang="en-US" dirty="0"/>
-              <a:t>National Low Income Housing Coalition</a:t>
-            </a:r>
-          </a:p>
-          <a:p>
-            <a:r>
-              <a:rPr lang="en-US" dirty="0"/>
-              <a:t>National Highway Traffic Safety Administration (API)</a:t>
-            </a:r>
-          </a:p>
-          <a:p>
-            <a:r>
-              <a:rPr lang="en-US" dirty="0" err="1"/>
-              <a:t>Everyvine</a:t>
-            </a:r>
-            <a:endParaRPr lang="en-US" dirty="0"/>
-          </a:p>
-          <a:p>
-            <a:r>
-              <a:rPr lang="en-US" dirty="0" err="1"/>
-              <a:t>VinePair</a:t>
-            </a:r>
-            <a:endParaRPr lang="en-US" dirty="0"/>
-          </a:p>
-        </p:txBody>
-      </p:sp>
-      <p:sp>
-        <p:nvSpPr>
-          <p:cNvPr id="5" name="Text Placeholder 4">
-            <a:extLst>
-              <a:ext uri="{FF2B5EF4-FFF2-40B4-BE49-F238E27FC236}">
-                <a16:creationId xmlns:a16="http://schemas.microsoft.com/office/drawing/2014/main" id="{09E6F272-B969-4EF0-B277-1022E4882208}"/>
-              </a:ext>
-            </a:extLst>
-          </p:cNvPr>
-          <p:cNvSpPr>
-            <a:spLocks noGrp="1"/>
-          </p:cNvSpPr>
-          <p:nvPr>
-            <p:ph type="body" sz="half" idx="2"/>
+            <p:ph type="body" idx="1"/>
           </p:nvPr>
         </p:nvSpPr>
         <p:spPr/>
@@ -8015,23 +7924,14 @@
           <a:bodyPr/>
           <a:lstStyle/>
           <a:p>
-            <a:r>
-              <a:rPr lang="en-US" dirty="0"/>
-              <a:t>The preceding analysis was based on data obtained from these sources.  </a:t>
-            </a:r>
-          </a:p>
-          <a:p>
-            <a:r>
-              <a:rPr lang="en-US" dirty="0"/>
-              <a:t>Unless noted, data files were obtained as csv files.</a:t>
-            </a:r>
+            <a:endParaRPr lang="en-US" dirty="0"/>
           </a:p>
         </p:txBody>
       </p:sp>
     </p:spTree>
     <p:extLst>
       <p:ext uri="{BB962C8B-B14F-4D97-AF65-F5344CB8AC3E}">
-        <p14:creationId xmlns:p14="http://schemas.microsoft.com/office/powerpoint/2010/main" val="3202105955"/>
+        <p14:creationId xmlns:p14="http://schemas.microsoft.com/office/powerpoint/2010/main" val="3623446405"/>
       </p:ext>
     </p:extLst>
   </p:cSld>
@@ -8060,10 +7960,10 @@
       </p:grpSpPr>
       <p:sp>
         <p:nvSpPr>
-          <p:cNvPr id="2" name="Title 1">
+          <p:cNvPr id="4" name="Title 3">
             <a:extLst>
               <a:ext uri="{FF2B5EF4-FFF2-40B4-BE49-F238E27FC236}">
-                <a16:creationId xmlns:a16="http://schemas.microsoft.com/office/drawing/2014/main" id="{8C9097F5-AE4E-4BF4-BAFE-800B133A51EC}"/>
+                <a16:creationId xmlns:a16="http://schemas.microsoft.com/office/drawing/2014/main" id="{2AB37ED5-3491-430E-80AE-1EB48CA271D2}"/>
               </a:ext>
             </a:extLst>
           </p:cNvPr>
@@ -8076,22 +7976,22 @@
         </p:nvSpPr>
         <p:spPr/>
         <p:txBody>
-          <a:bodyPr anchor="t"/>
+          <a:bodyPr/>
           <a:lstStyle/>
           <a:p>
             <a:r>
               <a:rPr lang="en-US" dirty="0"/>
-              <a:t>Appendix: Next Steps</a:t>
+              <a:t>references</a:t>
             </a:r>
           </a:p>
         </p:txBody>
       </p:sp>
       <p:sp>
         <p:nvSpPr>
-          <p:cNvPr id="3" name="Content Placeholder 2">
+          <p:cNvPr id="7" name="Text Placeholder 6">
             <a:extLst>
               <a:ext uri="{FF2B5EF4-FFF2-40B4-BE49-F238E27FC236}">
-                <a16:creationId xmlns:a16="http://schemas.microsoft.com/office/drawing/2014/main" id="{38B737FA-D748-44C7-90D5-7B0EAC9B8DCE}"/>
+                <a16:creationId xmlns:a16="http://schemas.microsoft.com/office/drawing/2014/main" id="{8C52ACDC-83BB-415A-A11E-E704EFEC3A3D}"/>
               </a:ext>
             </a:extLst>
           </p:cNvPr>
@@ -8104,17 +8004,118 @@
         </p:nvSpPr>
         <p:spPr/>
         <p:txBody>
+          <a:bodyPr>
+            <a:normAutofit fontScale="92500" lnSpcReduction="20000"/>
+          </a:bodyPr>
+          <a:lstStyle/>
+          <a:p>
+            <a:r>
+              <a:rPr lang="en-US" dirty="0"/>
+              <a:t>Wine &amp; Vines</a:t>
+            </a:r>
+          </a:p>
+          <a:p>
+            <a:r>
+              <a:rPr lang="en-US" dirty="0"/>
+              <a:t>US Census Bureau</a:t>
+            </a:r>
+          </a:p>
+          <a:p>
+            <a:r>
+              <a:rPr lang="en-US" dirty="0"/>
+              <a:t>Department of the Treasury, Alcohol, Tobacco Tax and Trade Bureau</a:t>
+            </a:r>
+          </a:p>
+          <a:p>
+            <a:r>
+              <a:rPr lang="en-US" dirty="0"/>
+              <a:t>National Institute on Alcohol Abuse and Alcoholism</a:t>
+            </a:r>
+          </a:p>
+          <a:p>
+            <a:r>
+              <a:rPr lang="en-US" dirty="0"/>
+              <a:t>Bureau of Economic Analysis</a:t>
+            </a:r>
+          </a:p>
+          <a:p>
+            <a:r>
+              <a:rPr lang="en-US" dirty="0"/>
+              <a:t>Centers for Disease Control and Prevention</a:t>
+            </a:r>
+          </a:p>
+          <a:p>
+            <a:r>
+              <a:rPr lang="en-US" dirty="0"/>
+              <a:t>Kaiser Family Foundation</a:t>
+            </a:r>
+          </a:p>
+          <a:p>
+            <a:r>
+              <a:rPr lang="en-US" dirty="0"/>
+              <a:t>National Low Income Housing Coalition</a:t>
+            </a:r>
+          </a:p>
+          <a:p>
+            <a:r>
+              <a:rPr lang="en-US" dirty="0"/>
+              <a:t>National Highway Traffic Safety Administration (API)</a:t>
+            </a:r>
+          </a:p>
+          <a:p>
+            <a:r>
+              <a:rPr lang="en-US" dirty="0" err="1"/>
+              <a:t>Everyvine</a:t>
+            </a:r>
+            <a:endParaRPr lang="en-US" dirty="0"/>
+          </a:p>
+          <a:p>
+            <a:r>
+              <a:rPr lang="en-US" dirty="0" err="1"/>
+              <a:t>VinePair</a:t>
+            </a:r>
+            <a:endParaRPr lang="en-US" dirty="0"/>
+          </a:p>
+        </p:txBody>
+      </p:sp>
+      <p:sp>
+        <p:nvSpPr>
+          <p:cNvPr id="5" name="Text Placeholder 4">
+            <a:extLst>
+              <a:ext uri="{FF2B5EF4-FFF2-40B4-BE49-F238E27FC236}">
+                <a16:creationId xmlns:a16="http://schemas.microsoft.com/office/drawing/2014/main" id="{09E6F272-B969-4EF0-B277-1022E4882208}"/>
+              </a:ext>
+            </a:extLst>
+          </p:cNvPr>
+          <p:cNvSpPr>
+            <a:spLocks noGrp="1"/>
+          </p:cNvSpPr>
+          <p:nvPr>
+            <p:ph type="body" sz="half" idx="2"/>
+          </p:nvPr>
+        </p:nvSpPr>
+        <p:spPr/>
+        <p:txBody>
           <a:bodyPr/>
           <a:lstStyle/>
           <a:p>
-            <a:endParaRPr lang="en-US"/>
+            <a:r>
+              <a:rPr lang="en-US" dirty="0"/>
+              <a:t>The preceding analysis was based on data obtained from these sources.  </a:t>
+            </a:r>
+          </a:p>
+          <a:p>
+            <a:r>
+              <a:rPr lang="en-US" dirty="0"/>
+              <a:t>Unless noted, data files were obtained as csv files.</a:t>
+            </a:r>
           </a:p>
         </p:txBody>
       </p:sp>
     </p:spTree>
     <p:extLst>
       <p:ext uri="{BB962C8B-B14F-4D97-AF65-F5344CB8AC3E}">
-        <p14:creationId xmlns:p14="http://schemas.microsoft.com/office/powerpoint/2010/main" val="3996635378"/>
+        <p14:creationId xmlns:p14="http://schemas.microsoft.com/office/powerpoint/2010/main" val="3202105955"/>
       </p:ext>
     </p:extLst>
   </p:cSld>
@@ -8143,6 +8144,113 @@
       </p:grpSpPr>
       <p:sp>
         <p:nvSpPr>
+          <p:cNvPr id="2" name="Title 1">
+            <a:extLst>
+              <a:ext uri="{FF2B5EF4-FFF2-40B4-BE49-F238E27FC236}">
+                <a16:creationId xmlns:a16="http://schemas.microsoft.com/office/drawing/2014/main" id="{8C9097F5-AE4E-4BF4-BAFE-800B133A51EC}"/>
+              </a:ext>
+            </a:extLst>
+          </p:cNvPr>
+          <p:cNvSpPr>
+            <a:spLocks noGrp="1"/>
+          </p:cNvSpPr>
+          <p:nvPr>
+            <p:ph type="title"/>
+          </p:nvPr>
+        </p:nvSpPr>
+        <p:spPr/>
+        <p:txBody>
+          <a:bodyPr anchor="t"/>
+          <a:lstStyle/>
+          <a:p>
+            <a:r>
+              <a:rPr lang="en-US" dirty="0"/>
+              <a:t>Appendix: Next Steps</a:t>
+            </a:r>
+          </a:p>
+        </p:txBody>
+      </p:sp>
+      <p:sp>
+        <p:nvSpPr>
+          <p:cNvPr id="3" name="Content Placeholder 2">
+            <a:extLst>
+              <a:ext uri="{FF2B5EF4-FFF2-40B4-BE49-F238E27FC236}">
+                <a16:creationId xmlns:a16="http://schemas.microsoft.com/office/drawing/2014/main" id="{38B737FA-D748-44C7-90D5-7B0EAC9B8DCE}"/>
+              </a:ext>
+            </a:extLst>
+          </p:cNvPr>
+          <p:cNvSpPr>
+            <a:spLocks noGrp="1"/>
+          </p:cNvSpPr>
+          <p:nvPr>
+            <p:ph idx="1"/>
+          </p:nvPr>
+        </p:nvSpPr>
+        <p:spPr/>
+        <p:txBody>
+          <a:bodyPr/>
+          <a:lstStyle/>
+          <a:p>
+            <a:r>
+              <a:rPr lang="en-US" dirty="0"/>
+              <a:t>Different alcohol types and influence</a:t>
+            </a:r>
+          </a:p>
+          <a:p>
+            <a:r>
+              <a:rPr lang="en-US" dirty="0"/>
+              <a:t>Further dives in crash data to more localized sections</a:t>
+            </a:r>
+          </a:p>
+          <a:p>
+            <a:r>
+              <a:rPr lang="en-US" dirty="0"/>
+              <a:t>Review for external influencing factors in health concerns</a:t>
+            </a:r>
+          </a:p>
+          <a:p>
+            <a:r>
+              <a:rPr lang="en-US" dirty="0"/>
+              <a:t>Review economic impacts from downturns on overall spend and consumption</a:t>
+            </a:r>
+          </a:p>
+          <a:p>
+            <a:endParaRPr lang="en-US" dirty="0"/>
+          </a:p>
+        </p:txBody>
+      </p:sp>
+    </p:spTree>
+    <p:extLst>
+      <p:ext uri="{BB962C8B-B14F-4D97-AF65-F5344CB8AC3E}">
+        <p14:creationId xmlns:p14="http://schemas.microsoft.com/office/powerpoint/2010/main" val="444295545"/>
+      </p:ext>
+    </p:extLst>
+  </p:cSld>
+  <p:clrMapOvr>
+    <a:masterClrMapping/>
+  </p:clrMapOvr>
+</p:sld>
+</file>
+
+<file path=ppt/slides/slide13.xml><?xml version="1.0" encoding="utf-8"?>
+<p:sld xmlns:a="http://schemas.openxmlformats.org/drawingml/2006/main" xmlns:r="http://schemas.openxmlformats.org/officeDocument/2006/relationships" xmlns:p="http://schemas.openxmlformats.org/presentationml/2006/main">
+  <p:cSld>
+    <p:spTree>
+      <p:nvGrpSpPr>
+        <p:cNvPr id="1" name=""/>
+        <p:cNvGrpSpPr/>
+        <p:nvPr/>
+      </p:nvGrpSpPr>
+      <p:grpSpPr>
+        <a:xfrm>
+          <a:off x="0" y="0"/>
+          <a:ext cx="0" cy="0"/>
+          <a:chOff x="0" y="0"/>
+          <a:chExt cx="0" cy="0"/>
+        </a:xfrm>
+      </p:grpSpPr>
+      <p:sp>
+        <p:nvSpPr>
           <p:cNvPr id="7" name="Title 6">
             <a:extLst>
               <a:ext uri="{FF2B5EF4-FFF2-40B4-BE49-F238E27FC236}">
@@ -8169,35 +8277,44 @@
           </a:p>
         </p:txBody>
       </p:sp>
-      <p:sp>
-        <p:nvSpPr>
-          <p:cNvPr id="8" name="Content Placeholder 7">
+      <p:pic>
+        <p:nvPicPr>
+          <p:cNvPr id="4" name="Picture Placeholder 13" descr="A screenshot of a cell phone&#10;&#10;Description automatically generated">
             <a:extLst>
               <a:ext uri="{FF2B5EF4-FFF2-40B4-BE49-F238E27FC236}">
-                <a16:creationId xmlns:a16="http://schemas.microsoft.com/office/drawing/2014/main" id="{890E7159-35FB-4586-AB75-48B26E4B776C}"/>
+                <a16:creationId xmlns:a16="http://schemas.microsoft.com/office/drawing/2014/main" id="{A0FA9961-607E-4314-92AD-9AF8BF488441}"/>
               </a:ext>
             </a:extLst>
           </p:cNvPr>
-          <p:cNvSpPr>
-            <a:spLocks noGrp="1"/>
-          </p:cNvSpPr>
+          <p:cNvPicPr>
+            <a:picLocks noGrp="1" noChangeAspect="1"/>
+          </p:cNvPicPr>
           <p:nvPr>
             <p:ph idx="1"/>
           </p:nvPr>
-        </p:nvSpPr>
-        <p:spPr/>
-        <p:txBody>
-          <a:bodyPr/>
-          <a:lstStyle/>
-          <a:p>
-            <a:endParaRPr lang="en-US"/>
-          </a:p>
-        </p:txBody>
-      </p:sp>
+        </p:nvPicPr>
+        <p:blipFill rotWithShape="1">
+          <a:blip r:embed="rId2">
+            <a:extLst>
+              <a:ext uri="{28A0092B-C50C-407E-A947-70E740481C1C}">
+                <a14:useLocalDpi xmlns:a14="http://schemas.microsoft.com/office/drawing/2010/main" val="0"/>
+              </a:ext>
+            </a:extLst>
+          </a:blip>
+          <a:srcRect t="-167" b="-225"/>
+          <a:stretch/>
+        </p:blipFill>
+        <p:spPr>
+          <a:xfrm>
+            <a:off x="474131" y="2319041"/>
+            <a:ext cx="4071278" cy="1887398"/>
+          </a:xfrm>
+        </p:spPr>
+      </p:pic>
     </p:spTree>
     <p:extLst>
       <p:ext uri="{BB962C8B-B14F-4D97-AF65-F5344CB8AC3E}">
-        <p14:creationId xmlns:p14="http://schemas.microsoft.com/office/powerpoint/2010/main" val="2946730448"/>
+        <p14:creationId xmlns:p14="http://schemas.microsoft.com/office/powerpoint/2010/main" val="1707495564"/>
       </p:ext>
     </p:extLst>
   </p:cSld>
@@ -8208,6 +8325,72 @@
 </file>
 
 <file path=ppt/slides/slide2.xml><?xml version="1.0" encoding="utf-8"?>
+<p:sld xmlns:a="http://schemas.openxmlformats.org/drawingml/2006/main" xmlns:r="http://schemas.openxmlformats.org/officeDocument/2006/relationships" xmlns:p="http://schemas.openxmlformats.org/presentationml/2006/main">
+  <p:cSld>
+    <p:spTree>
+      <p:nvGrpSpPr>
+        <p:cNvPr id="1" name=""/>
+        <p:cNvGrpSpPr/>
+        <p:nvPr/>
+      </p:nvGrpSpPr>
+      <p:grpSpPr>
+        <a:xfrm>
+          <a:off x="0" y="0"/>
+          <a:ext cx="0" cy="0"/>
+          <a:chOff x="0" y="0"/>
+          <a:chExt cx="0" cy="0"/>
+        </a:xfrm>
+      </p:grpSpPr>
+      <p:pic>
+        <p:nvPicPr>
+          <p:cNvPr id="3" name="Picture 2" descr="A screenshot of a cell phone&#10;&#10;Description automatically generated">
+            <a:extLst>
+              <a:ext uri="{FF2B5EF4-FFF2-40B4-BE49-F238E27FC236}">
+                <a16:creationId xmlns:a16="http://schemas.microsoft.com/office/drawing/2014/main" id="{40AF7058-E85E-483E-B32E-AF3FAEF38662}"/>
+              </a:ext>
+            </a:extLst>
+          </p:cNvPr>
+          <p:cNvPicPr>
+            <a:picLocks noChangeAspect="1"/>
+          </p:cNvPicPr>
+          <p:nvPr/>
+        </p:nvPicPr>
+        <p:blipFill>
+          <a:blip r:embed="rId2">
+            <a:extLst>
+              <a:ext uri="{28A0092B-C50C-407E-A947-70E740481C1C}">
+                <a14:useLocalDpi xmlns:a14="http://schemas.microsoft.com/office/drawing/2010/main" val="0"/>
+              </a:ext>
+            </a:extLst>
+          </a:blip>
+          <a:stretch>
+            <a:fillRect/>
+          </a:stretch>
+        </p:blipFill>
+        <p:spPr>
+          <a:xfrm>
+            <a:off x="1837543" y="1030116"/>
+            <a:ext cx="7640790" cy="5297108"/>
+          </a:xfrm>
+          <a:prstGeom prst="rect">
+            <a:avLst/>
+          </a:prstGeom>
+        </p:spPr>
+      </p:pic>
+    </p:spTree>
+    <p:extLst>
+      <p:ext uri="{BB962C8B-B14F-4D97-AF65-F5344CB8AC3E}">
+        <p14:creationId xmlns:p14="http://schemas.microsoft.com/office/powerpoint/2010/main" val="274111141"/>
+      </p:ext>
+    </p:extLst>
+  </p:cSld>
+  <p:clrMapOvr>
+    <a:masterClrMapping/>
+  </p:clrMapOvr>
+</p:sld>
+</file>
+
+<file path=ppt/slides/slide3.xml><?xml version="1.0" encoding="utf-8"?>
 <p:sld xmlns:a="http://schemas.openxmlformats.org/drawingml/2006/main" xmlns:r="http://schemas.openxmlformats.org/officeDocument/2006/relationships" xmlns:p="http://schemas.openxmlformats.org/presentationml/2006/main">
   <p:cSld>
     <p:spTree>
@@ -8296,94 +8479,6 @@
 </p:sld>
 </file>
 
-<file path=ppt/slides/slide3.xml><?xml version="1.0" encoding="utf-8"?>
-<p:sld xmlns:a="http://schemas.openxmlformats.org/drawingml/2006/main" xmlns:r="http://schemas.openxmlformats.org/officeDocument/2006/relationships" xmlns:p="http://schemas.openxmlformats.org/presentationml/2006/main">
-  <p:cSld>
-    <p:spTree>
-      <p:nvGrpSpPr>
-        <p:cNvPr id="1" name=""/>
-        <p:cNvGrpSpPr/>
-        <p:nvPr/>
-      </p:nvGrpSpPr>
-      <p:grpSpPr>
-        <a:xfrm>
-          <a:off x="0" y="0"/>
-          <a:ext cx="0" cy="0"/>
-          <a:chOff x="0" y="0"/>
-          <a:chExt cx="0" cy="0"/>
-        </a:xfrm>
-      </p:grpSpPr>
-      <p:sp>
-        <p:nvSpPr>
-          <p:cNvPr id="2" name="Title 1">
-            <a:extLst>
-              <a:ext uri="{FF2B5EF4-FFF2-40B4-BE49-F238E27FC236}">
-                <a16:creationId xmlns:a16="http://schemas.microsoft.com/office/drawing/2014/main" id="{B3F0A3C9-4572-4C98-9D8D-15D88BA85200}"/>
-              </a:ext>
-            </a:extLst>
-          </p:cNvPr>
-          <p:cNvSpPr>
-            <a:spLocks noGrp="1"/>
-          </p:cNvSpPr>
-          <p:nvPr>
-            <p:ph type="title"/>
-          </p:nvPr>
-        </p:nvSpPr>
-        <p:spPr>
-          <a:xfrm>
-            <a:off x="581192" y="702156"/>
-            <a:ext cx="11029616" cy="1188720"/>
-          </a:xfrm>
-        </p:spPr>
-        <p:txBody>
-          <a:bodyPr anchor="t"/>
-          <a:lstStyle/>
-          <a:p>
-            <a:r>
-              <a:rPr lang="en-US" dirty="0"/>
-              <a:t>Winery growth and consumption</a:t>
-            </a:r>
-          </a:p>
-        </p:txBody>
-      </p:sp>
-      <p:sp>
-        <p:nvSpPr>
-          <p:cNvPr id="3" name="Content Placeholder 2">
-            <a:extLst>
-              <a:ext uri="{FF2B5EF4-FFF2-40B4-BE49-F238E27FC236}">
-                <a16:creationId xmlns:a16="http://schemas.microsoft.com/office/drawing/2014/main" id="{F360DE0A-E8ED-4A6D-84CE-7782113F379C}"/>
-              </a:ext>
-            </a:extLst>
-          </p:cNvPr>
-          <p:cNvSpPr>
-            <a:spLocks noGrp="1"/>
-          </p:cNvSpPr>
-          <p:nvPr>
-            <p:ph idx="1"/>
-          </p:nvPr>
-        </p:nvSpPr>
-        <p:spPr/>
-        <p:txBody>
-          <a:bodyPr/>
-          <a:lstStyle/>
-          <a:p>
-            <a:endParaRPr lang="en-US"/>
-          </a:p>
-        </p:txBody>
-      </p:sp>
-    </p:spTree>
-    <p:extLst>
-      <p:ext uri="{BB962C8B-B14F-4D97-AF65-F5344CB8AC3E}">
-        <p14:creationId xmlns:p14="http://schemas.microsoft.com/office/powerpoint/2010/main" val="2657318117"/>
-      </p:ext>
-    </p:extLst>
-  </p:cSld>
-  <p:clrMapOvr>
-    <a:masterClrMapping/>
-  </p:clrMapOvr>
-</p:sld>
-</file>
-
 <file path=ppt/slides/slide4.xml><?xml version="1.0" encoding="utf-8"?>
 <p:sld xmlns:a="http://schemas.openxmlformats.org/drawingml/2006/main" xmlns:r="http://schemas.openxmlformats.org/officeDocument/2006/relationships" xmlns:p="http://schemas.openxmlformats.org/presentationml/2006/main">
   <p:cSld>
@@ -8417,14 +8512,19 @@
             <p:ph type="title"/>
           </p:nvPr>
         </p:nvSpPr>
-        <p:spPr/>
+        <p:spPr>
+          <a:xfrm>
+            <a:off x="581192" y="702156"/>
+            <a:ext cx="11029616" cy="538065"/>
+          </a:xfrm>
+        </p:spPr>
         <p:txBody>
-          <a:bodyPr anchor="t"/>
+          <a:bodyPr/>
           <a:lstStyle/>
           <a:p>
             <a:r>
               <a:rPr lang="en-US" dirty="0"/>
-              <a:t>Tourism economic impacts</a:t>
+              <a:t>Winery growth and consumption</a:t>
             </a:r>
           </a:p>
         </p:txBody>
@@ -8445,19 +8545,173 @@
             <p:ph idx="1"/>
           </p:nvPr>
         </p:nvSpPr>
-        <p:spPr/>
+        <p:spPr>
+          <a:xfrm>
+            <a:off x="581192" y="1240221"/>
+            <a:ext cx="5588379" cy="5013434"/>
+          </a:xfrm>
+        </p:spPr>
         <p:txBody>
-          <a:bodyPr/>
+          <a:bodyPr>
+            <a:noAutofit/>
+          </a:bodyPr>
           <a:lstStyle/>
           <a:p>
+            <a:pPr algn="just"/>
+            <a:r>
+              <a:rPr lang="en-US" sz="1400" dirty="0"/>
+              <a:t>Fun Facts </a:t>
+            </a:r>
+          </a:p>
+          <a:p>
+            <a:pPr lvl="1" algn="just"/>
+            <a:r>
+              <a:rPr lang="en-US" dirty="0"/>
+              <a:t>The US is the fourth biggest wine producing nation in the Planet, right after France, Spain and Italy</a:t>
+            </a:r>
+          </a:p>
+          <a:p>
+            <a:pPr lvl="1" algn="just"/>
+            <a:r>
+              <a:rPr lang="en-US" dirty="0"/>
+              <a:t>Wine Production in the US dates back to the 16</a:t>
+            </a:r>
+            <a:r>
+              <a:rPr lang="en-US" baseline="30000" dirty="0"/>
+              <a:t>th</a:t>
+            </a:r>
+            <a:r>
+              <a:rPr lang="en-US" dirty="0"/>
+              <a:t> century, when the French Huguenot settlers made wine in Jacksonville, Florida using Scuppernong grapes</a:t>
+            </a:r>
+          </a:p>
+          <a:p>
+            <a:pPr lvl="1" algn="just"/>
+            <a:r>
+              <a:rPr lang="en-US" dirty="0"/>
+              <a:t>89% of all American wine is produced in California</a:t>
+            </a:r>
+          </a:p>
+          <a:p>
+            <a:pPr marL="324000" lvl="1" indent="0" algn="just">
+              <a:buNone/>
+            </a:pPr>
             <a:endParaRPr lang="en-US" dirty="0"/>
           </a:p>
+          <a:p>
+            <a:pPr algn="just"/>
+            <a:r>
+              <a:rPr lang="en-US" sz="1400" dirty="0"/>
+              <a:t>Data analyzed was narrowed from 2009 to 2017 </a:t>
+            </a:r>
+          </a:p>
+          <a:p>
+            <a:pPr lvl="1" algn="just"/>
+            <a:r>
+              <a:rPr lang="en-US" dirty="0"/>
+              <a:t>US consumption per capita rose steadily along with the number of new wineries</a:t>
+            </a:r>
+          </a:p>
+          <a:p>
+            <a:pPr lvl="1" algn="just"/>
+            <a:r>
+              <a:rPr lang="en-US" dirty="0"/>
+              <a:t>On a state-wide basis, the biggest jump in wine producers came from California. However wine consumption per capita  in this state saw lowest growth of the considered group</a:t>
+            </a:r>
+          </a:p>
+          <a:p>
+            <a:pPr lvl="1" algn="just"/>
+            <a:r>
+              <a:rPr lang="en-US" dirty="0"/>
+              <a:t>Highest increase in wine consumption per capita appears to occur in Oregon, closely followed by Texas (woo-</a:t>
+            </a:r>
+            <a:r>
+              <a:rPr lang="en-US" dirty="0" err="1"/>
+              <a:t>hoo</a:t>
+            </a:r>
+            <a:r>
+              <a:rPr lang="en-US" dirty="0"/>
+              <a:t>!!)</a:t>
+            </a:r>
+          </a:p>
         </p:txBody>
       </p:sp>
+      <p:pic>
+        <p:nvPicPr>
+          <p:cNvPr id="5" name="Picture 4" descr="A screenshot of a cell phone&#10;&#10;Description automatically generated">
+            <a:extLst>
+              <a:ext uri="{FF2B5EF4-FFF2-40B4-BE49-F238E27FC236}">
+                <a16:creationId xmlns:a16="http://schemas.microsoft.com/office/drawing/2014/main" id="{98807E94-F1B8-074F-B0FE-6367CC778F75}"/>
+              </a:ext>
+            </a:extLst>
+          </p:cNvPr>
+          <p:cNvPicPr>
+            <a:picLocks noChangeAspect="1"/>
+          </p:cNvPicPr>
+          <p:nvPr/>
+        </p:nvPicPr>
+        <p:blipFill>
+          <a:blip r:embed="rId2">
+            <a:extLst>
+              <a:ext uri="{28A0092B-C50C-407E-A947-70E740481C1C}">
+                <a14:useLocalDpi xmlns:a14="http://schemas.microsoft.com/office/drawing/2010/main" val="0"/>
+              </a:ext>
+            </a:extLst>
+          </a:blip>
+          <a:stretch>
+            <a:fillRect/>
+          </a:stretch>
+        </p:blipFill>
+        <p:spPr>
+          <a:xfrm>
+            <a:off x="7357240" y="702156"/>
+            <a:ext cx="4147717" cy="3094764"/>
+          </a:xfrm>
+          <a:prstGeom prst="rect">
+            <a:avLst/>
+          </a:prstGeom>
+        </p:spPr>
+      </p:pic>
+      <p:pic>
+        <p:nvPicPr>
+          <p:cNvPr id="8" name="Picture 7" descr="A screenshot of a cell phone&#10;&#10;Description automatically generated">
+            <a:extLst>
+              <a:ext uri="{FF2B5EF4-FFF2-40B4-BE49-F238E27FC236}">
+                <a16:creationId xmlns:a16="http://schemas.microsoft.com/office/drawing/2014/main" id="{E3ED156F-9C67-D549-8C05-6AF9E29081DB}"/>
+              </a:ext>
+            </a:extLst>
+          </p:cNvPr>
+          <p:cNvPicPr>
+            <a:picLocks noChangeAspect="1"/>
+          </p:cNvPicPr>
+          <p:nvPr/>
+        </p:nvPicPr>
+        <p:blipFill>
+          <a:blip r:embed="rId3">
+            <a:extLst>
+              <a:ext uri="{28A0092B-C50C-407E-A947-70E740481C1C}">
+                <a14:useLocalDpi xmlns:a14="http://schemas.microsoft.com/office/drawing/2010/main" val="0"/>
+              </a:ext>
+            </a:extLst>
+          </a:blip>
+          <a:stretch>
+            <a:fillRect/>
+          </a:stretch>
+        </p:blipFill>
+        <p:spPr>
+          <a:xfrm>
+            <a:off x="7484824" y="3881384"/>
+            <a:ext cx="4125983" cy="2924066"/>
+          </a:xfrm>
+          <a:prstGeom prst="rect">
+            <a:avLst/>
+          </a:prstGeom>
+        </p:spPr>
+      </p:pic>
     </p:spTree>
     <p:extLst>
       <p:ext uri="{BB962C8B-B14F-4D97-AF65-F5344CB8AC3E}">
-        <p14:creationId xmlns:p14="http://schemas.microsoft.com/office/powerpoint/2010/main" val="1984415013"/>
+        <p14:creationId xmlns:p14="http://schemas.microsoft.com/office/powerpoint/2010/main" val="1827622436"/>
       </p:ext>
     </p:extLst>
   </p:cSld>
@@ -8507,17 +8761,17 @@
           <a:p>
             <a:r>
               <a:rPr lang="en-US" dirty="0"/>
-              <a:t>Price Parity/affordability</a:t>
+              <a:t>Tourism economic impacts</a:t>
             </a:r>
           </a:p>
         </p:txBody>
       </p:sp>
       <p:sp>
         <p:nvSpPr>
-          <p:cNvPr id="3" name="Content Placeholder 2">
+          <p:cNvPr id="34" name="Text Placeholder 33">
             <a:extLst>
               <a:ext uri="{FF2B5EF4-FFF2-40B4-BE49-F238E27FC236}">
-                <a16:creationId xmlns:a16="http://schemas.microsoft.com/office/drawing/2014/main" id="{F360DE0A-E8ED-4A6D-84CE-7782113F379C}"/>
+                <a16:creationId xmlns:a16="http://schemas.microsoft.com/office/drawing/2014/main" id="{16CA31F5-65B7-47FE-8EDB-91E354543B67}"/>
               </a:ext>
             </a:extLst>
           </p:cNvPr>
@@ -8525,22 +8779,133 @@
             <a:spLocks noGrp="1"/>
           </p:cNvSpPr>
           <p:nvPr>
-            <p:ph idx="1"/>
+            <p:ph type="body" idx="1"/>
           </p:nvPr>
         </p:nvSpPr>
-        <p:spPr/>
+        <p:spPr>
+          <a:xfrm>
+            <a:off x="581191" y="5198152"/>
+            <a:ext cx="5194769" cy="557784"/>
+          </a:xfrm>
+        </p:spPr>
         <p:txBody>
           <a:bodyPr/>
           <a:lstStyle/>
           <a:p>
-            <a:endParaRPr lang="en-US"/>
+            <a:r>
+              <a:rPr lang="en-US" sz="1400" dirty="0"/>
+              <a:t>In general, the categories impacted most by tourism have impacted the overall Gross Domestic Product positively of each state the years shown.  However, this may be more impacted by natural aesthetic and seasonal draws such as beaches, mountains, etc. than necessarily the wineries alone.</a:t>
+            </a:r>
           </a:p>
         </p:txBody>
       </p:sp>
+      <p:pic>
+        <p:nvPicPr>
+          <p:cNvPr id="39" name="Content Placeholder 38" descr="A close up of a map&#10;&#10;Description automatically generated">
+            <a:extLst>
+              <a:ext uri="{FF2B5EF4-FFF2-40B4-BE49-F238E27FC236}">
+                <a16:creationId xmlns:a16="http://schemas.microsoft.com/office/drawing/2014/main" id="{E36C32D5-4D8F-4026-A975-3E9E376E48A7}"/>
+              </a:ext>
+            </a:extLst>
+          </p:cNvPr>
+          <p:cNvPicPr>
+            <a:picLocks noGrp="1" noChangeAspect="1"/>
+          </p:cNvPicPr>
+          <p:nvPr>
+            <p:ph sz="half" idx="2"/>
+          </p:nvPr>
+        </p:nvPicPr>
+        <p:blipFill>
+          <a:blip r:embed="rId2">
+            <a:extLst>
+              <a:ext uri="{28A0092B-C50C-407E-A947-70E740481C1C}">
+                <a14:useLocalDpi xmlns:a14="http://schemas.microsoft.com/office/drawing/2010/main" val="0"/>
+              </a:ext>
+            </a:extLst>
+          </a:blip>
+          <a:stretch>
+            <a:fillRect/>
+          </a:stretch>
+        </p:blipFill>
+        <p:spPr>
+          <a:xfrm>
+            <a:off x="954674" y="1633996"/>
+            <a:ext cx="4437993" cy="2935287"/>
+          </a:xfrm>
+        </p:spPr>
+      </p:pic>
+      <p:sp>
+        <p:nvSpPr>
+          <p:cNvPr id="36" name="Text Placeholder 35">
+            <a:extLst>
+              <a:ext uri="{FF2B5EF4-FFF2-40B4-BE49-F238E27FC236}">
+                <a16:creationId xmlns:a16="http://schemas.microsoft.com/office/drawing/2014/main" id="{5C084F4D-F9CF-4D68-A598-03FA32F06836}"/>
+              </a:ext>
+            </a:extLst>
+          </p:cNvPr>
+          <p:cNvSpPr>
+            <a:spLocks noGrp="1"/>
+          </p:cNvSpPr>
+          <p:nvPr>
+            <p:ph type="body" sz="quarter" idx="3"/>
+          </p:nvPr>
+        </p:nvSpPr>
+        <p:spPr>
+          <a:xfrm>
+            <a:off x="6416039" y="5198153"/>
+            <a:ext cx="5194770" cy="553373"/>
+          </a:xfrm>
+        </p:spPr>
+        <p:txBody>
+          <a:bodyPr/>
+          <a:lstStyle/>
+          <a:p>
+            <a:r>
+              <a:rPr lang="en-US" sz="1400" dirty="0"/>
+              <a:t>When drilling down further to the impact of food, beverage and tobacco production in which our winery data would be found, this segment across all states has played a smaller but very similar relative impact to each state since 2010.</a:t>
+            </a:r>
+          </a:p>
+        </p:txBody>
+      </p:sp>
+      <p:pic>
+        <p:nvPicPr>
+          <p:cNvPr id="41" name="Content Placeholder 40" descr="A picture containing text, map&#10;&#10;Description automatically generated">
+            <a:extLst>
+              <a:ext uri="{FF2B5EF4-FFF2-40B4-BE49-F238E27FC236}">
+                <a16:creationId xmlns:a16="http://schemas.microsoft.com/office/drawing/2014/main" id="{1CCD7C99-1674-4621-9B59-66D9E6EBAA4C}"/>
+              </a:ext>
+            </a:extLst>
+          </p:cNvPr>
+          <p:cNvPicPr>
+            <a:picLocks noGrp="1" noChangeAspect="1"/>
+          </p:cNvPicPr>
+          <p:nvPr>
+            <p:ph sz="quarter" idx="4"/>
+          </p:nvPr>
+        </p:nvPicPr>
+        <p:blipFill>
+          <a:blip r:embed="rId3">
+            <a:extLst>
+              <a:ext uri="{28A0092B-C50C-407E-A947-70E740481C1C}">
+                <a14:useLocalDpi xmlns:a14="http://schemas.microsoft.com/office/drawing/2010/main" val="0"/>
+              </a:ext>
+            </a:extLst>
+          </a:blip>
+          <a:stretch>
+            <a:fillRect/>
+          </a:stretch>
+        </p:blipFill>
+        <p:spPr>
+          <a:xfrm>
+            <a:off x="6919653" y="1633995"/>
+            <a:ext cx="4187542" cy="2935287"/>
+          </a:xfrm>
+        </p:spPr>
+      </p:pic>
     </p:spTree>
     <p:extLst>
       <p:ext uri="{BB962C8B-B14F-4D97-AF65-F5344CB8AC3E}">
-        <p14:creationId xmlns:p14="http://schemas.microsoft.com/office/powerpoint/2010/main" val="2173134109"/>
+        <p14:creationId xmlns:p14="http://schemas.microsoft.com/office/powerpoint/2010/main" val="1168244976"/>
       </p:ext>
     </p:extLst>
   </p:cSld>
@@ -8583,29 +8948,24 @@
             <p:ph type="title"/>
           </p:nvPr>
         </p:nvSpPr>
-        <p:spPr>
-          <a:xfrm>
-            <a:off x="581192" y="702156"/>
-            <a:ext cx="11029616" cy="1188720"/>
-          </a:xfrm>
-        </p:spPr>
+        <p:spPr/>
         <p:txBody>
           <a:bodyPr anchor="t"/>
           <a:lstStyle/>
           <a:p>
             <a:r>
               <a:rPr lang="en-US" dirty="0"/>
-              <a:t>Crash FATALITY rates</a:t>
+              <a:t>Price Parity/affordability</a:t>
             </a:r>
           </a:p>
         </p:txBody>
       </p:sp>
       <p:sp>
         <p:nvSpPr>
-          <p:cNvPr id="13" name="Content Placeholder 12">
+          <p:cNvPr id="3" name="Content Placeholder 2">
             <a:extLst>
               <a:ext uri="{FF2B5EF4-FFF2-40B4-BE49-F238E27FC236}">
-                <a16:creationId xmlns:a16="http://schemas.microsoft.com/office/drawing/2014/main" id="{FC1DDF83-C24A-4AB6-80C4-261B185CE2DB}"/>
+                <a16:creationId xmlns:a16="http://schemas.microsoft.com/office/drawing/2014/main" id="{F360DE0A-E8ED-4A6D-84CE-7782113F379C}"/>
               </a:ext>
             </a:extLst>
           </p:cNvPr>
@@ -8621,14 +8981,14 @@
           <a:bodyPr/>
           <a:lstStyle/>
           <a:p>
-            <a:endParaRPr lang="en-US" dirty="0"/>
+            <a:endParaRPr lang="en-US"/>
           </a:p>
         </p:txBody>
       </p:sp>
     </p:spTree>
     <p:extLst>
       <p:ext uri="{BB962C8B-B14F-4D97-AF65-F5344CB8AC3E}">
-        <p14:creationId xmlns:p14="http://schemas.microsoft.com/office/powerpoint/2010/main" val="711999099"/>
+        <p14:creationId xmlns:p14="http://schemas.microsoft.com/office/powerpoint/2010/main" val="2173134109"/>
       </p:ext>
     </p:extLst>
   </p:cSld>
@@ -8671,24 +9031,29 @@
             <p:ph type="title"/>
           </p:nvPr>
         </p:nvSpPr>
-        <p:spPr/>
+        <p:spPr>
+          <a:xfrm>
+            <a:off x="581192" y="702156"/>
+            <a:ext cx="11029616" cy="1188720"/>
+          </a:xfrm>
+        </p:spPr>
         <p:txBody>
           <a:bodyPr anchor="t"/>
           <a:lstStyle/>
           <a:p>
             <a:r>
               <a:rPr lang="en-US" dirty="0"/>
-              <a:t>Health implications</a:t>
+              <a:t>Crash FATALITY rates</a:t>
             </a:r>
           </a:p>
         </p:txBody>
       </p:sp>
       <p:sp>
         <p:nvSpPr>
-          <p:cNvPr id="3" name="Content Placeholder 2">
+          <p:cNvPr id="13" name="Content Placeholder 12">
             <a:extLst>
               <a:ext uri="{FF2B5EF4-FFF2-40B4-BE49-F238E27FC236}">
-                <a16:creationId xmlns:a16="http://schemas.microsoft.com/office/drawing/2014/main" id="{F360DE0A-E8ED-4A6D-84CE-7782113F379C}"/>
+                <a16:creationId xmlns:a16="http://schemas.microsoft.com/office/drawing/2014/main" id="{FC1DDF83-C24A-4AB6-80C4-261B185CE2DB}"/>
               </a:ext>
             </a:extLst>
           </p:cNvPr>
@@ -8704,14 +9069,14 @@
           <a:bodyPr/>
           <a:lstStyle/>
           <a:p>
-            <a:endParaRPr lang="en-US"/>
+            <a:endParaRPr lang="en-US" dirty="0"/>
           </a:p>
         </p:txBody>
       </p:sp>
     </p:spTree>
     <p:extLst>
       <p:ext uri="{BB962C8B-B14F-4D97-AF65-F5344CB8AC3E}">
-        <p14:creationId xmlns:p14="http://schemas.microsoft.com/office/powerpoint/2010/main" val="4221312452"/>
+        <p14:creationId xmlns:p14="http://schemas.microsoft.com/office/powerpoint/2010/main" val="711999099"/>
       </p:ext>
     </p:extLst>
   </p:cSld>
@@ -8761,7 +9126,7 @@
           <a:p>
             <a:r>
               <a:rPr lang="en-US" dirty="0"/>
-              <a:t>summary</a:t>
+              <a:t>Health implications</a:t>
             </a:r>
           </a:p>
         </p:txBody>
@@ -8782,19 +9147,146 @@
             <p:ph idx="1"/>
           </p:nvPr>
         </p:nvSpPr>
-        <p:spPr/>
+        <p:spPr>
+          <a:xfrm>
+            <a:off x="581192" y="2340864"/>
+            <a:ext cx="3534581" cy="3634486"/>
+          </a:xfrm>
+        </p:spPr>
         <p:txBody>
-          <a:bodyPr/>
+          <a:bodyPr>
+            <a:normAutofit/>
+          </a:bodyPr>
           <a:lstStyle/>
           <a:p>
-            <a:endParaRPr lang="en-US" dirty="0"/>
+            <a:r>
+              <a:rPr lang="en-US" sz="1400" dirty="0"/>
+              <a:t>While some regions show health concerns associated to alcohol/wine consumption, we found correlation limited based on the data readily available.</a:t>
+            </a:r>
+          </a:p>
+          <a:p>
+            <a:endParaRPr lang="en-US" sz="1400" dirty="0"/>
+          </a:p>
+          <a:p>
+            <a:r>
+              <a:rPr lang="en-US" sz="1400" dirty="0"/>
+              <a:t>Colorado proved our outlier with some the largest shifts in mortality and obesity rates during the years measured.</a:t>
+            </a:r>
           </a:p>
         </p:txBody>
       </p:sp>
+      <p:pic>
+        <p:nvPicPr>
+          <p:cNvPr id="6" name="Content Placeholder 4" descr="A screenshot of a cell phone&#10;&#10;Description automatically generated">
+            <a:extLst>
+              <a:ext uri="{FF2B5EF4-FFF2-40B4-BE49-F238E27FC236}">
+                <a16:creationId xmlns:a16="http://schemas.microsoft.com/office/drawing/2014/main" id="{1F78A55E-D95B-442D-9C35-760192EBBE99}"/>
+              </a:ext>
+            </a:extLst>
+          </p:cNvPr>
+          <p:cNvPicPr>
+            <a:picLocks noChangeAspect="1"/>
+          </p:cNvPicPr>
+          <p:nvPr/>
+        </p:nvPicPr>
+        <p:blipFill>
+          <a:blip r:embed="rId2">
+            <a:extLst>
+              <a:ext uri="{28A0092B-C50C-407E-A947-70E740481C1C}">
+                <a14:useLocalDpi xmlns:a14="http://schemas.microsoft.com/office/drawing/2010/main" val="0"/>
+              </a:ext>
+            </a:extLst>
+          </a:blip>
+          <a:stretch>
+            <a:fillRect/>
+          </a:stretch>
+        </p:blipFill>
+        <p:spPr>
+          <a:xfrm>
+            <a:off x="8250355" y="1363206"/>
+            <a:ext cx="3763232" cy="2648554"/>
+          </a:xfrm>
+          <a:prstGeom prst="rect">
+            <a:avLst/>
+          </a:prstGeom>
+        </p:spPr>
+      </p:pic>
+      <p:pic>
+        <p:nvPicPr>
+          <p:cNvPr id="7" name="Picture 6" descr="A picture containing pencil&#10;&#10;Description automatically generated">
+            <a:extLst>
+              <a:ext uri="{FF2B5EF4-FFF2-40B4-BE49-F238E27FC236}">
+                <a16:creationId xmlns:a16="http://schemas.microsoft.com/office/drawing/2014/main" id="{993923D1-76B4-4B66-A166-31B647CCB011}"/>
+              </a:ext>
+            </a:extLst>
+          </p:cNvPr>
+          <p:cNvPicPr>
+            <a:picLocks noChangeAspect="1"/>
+          </p:cNvPicPr>
+          <p:nvPr/>
+        </p:nvPicPr>
+        <p:blipFill>
+          <a:blip r:embed="rId3">
+            <a:extLst>
+              <a:ext uri="{28A0092B-C50C-407E-A947-70E740481C1C}">
+                <a14:useLocalDpi xmlns:a14="http://schemas.microsoft.com/office/drawing/2010/main" val="0"/>
+              </a:ext>
+            </a:extLst>
+          </a:blip>
+          <a:stretch>
+            <a:fillRect/>
+          </a:stretch>
+        </p:blipFill>
+        <p:spPr>
+          <a:xfrm>
+            <a:off x="6483065" y="4137172"/>
+            <a:ext cx="3534581" cy="2715244"/>
+          </a:xfrm>
+          <a:prstGeom prst="rect">
+            <a:avLst/>
+          </a:prstGeom>
+        </p:spPr>
+      </p:pic>
+      <p:pic>
+        <p:nvPicPr>
+          <p:cNvPr id="8" name="Picture 7" descr="A close up of text on a white background&#10;&#10;Description automatically generated">
+            <a:extLst>
+              <a:ext uri="{FF2B5EF4-FFF2-40B4-BE49-F238E27FC236}">
+                <a16:creationId xmlns:a16="http://schemas.microsoft.com/office/drawing/2014/main" id="{9C2DA0AD-C0A5-4AAF-96F1-26A22C0E0F0F}"/>
+              </a:ext>
+            </a:extLst>
+          </p:cNvPr>
+          <p:cNvPicPr>
+            <a:picLocks noChangeAspect="1"/>
+          </p:cNvPicPr>
+          <p:nvPr/>
+        </p:nvPicPr>
+        <p:blipFill>
+          <a:blip r:embed="rId4">
+            <a:extLst>
+              <a:ext uri="{28A0092B-C50C-407E-A947-70E740481C1C}">
+                <a14:useLocalDpi xmlns:a14="http://schemas.microsoft.com/office/drawing/2010/main" val="0"/>
+              </a:ext>
+            </a:extLst>
+          </a:blip>
+          <a:stretch>
+            <a:fillRect/>
+          </a:stretch>
+        </p:blipFill>
+        <p:spPr>
+          <a:xfrm>
+            <a:off x="4324482" y="1363206"/>
+            <a:ext cx="3896613" cy="2648554"/>
+          </a:xfrm>
+          <a:prstGeom prst="rect">
+            <a:avLst/>
+          </a:prstGeom>
+        </p:spPr>
+      </p:pic>
     </p:spTree>
     <p:extLst>
       <p:ext uri="{BB962C8B-B14F-4D97-AF65-F5344CB8AC3E}">
-        <p14:creationId xmlns:p14="http://schemas.microsoft.com/office/powerpoint/2010/main" val="3981026224"/>
+        <p14:creationId xmlns:p14="http://schemas.microsoft.com/office/powerpoint/2010/main" val="4183563009"/>
       </p:ext>
     </p:extLst>
   </p:cSld>
@@ -8823,10 +9315,10 @@
       </p:grpSpPr>
       <p:sp>
         <p:nvSpPr>
-          <p:cNvPr id="7" name="Title 6">
+          <p:cNvPr id="2" name="Title 1">
             <a:extLst>
               <a:ext uri="{FF2B5EF4-FFF2-40B4-BE49-F238E27FC236}">
-                <a16:creationId xmlns:a16="http://schemas.microsoft.com/office/drawing/2014/main" id="{D4B7B706-54E9-4555-844A-65D6DA5534BD}"/>
+                <a16:creationId xmlns:a16="http://schemas.microsoft.com/office/drawing/2014/main" id="{B3F0A3C9-4572-4C98-9D8D-15D88BA85200}"/>
               </a:ext>
             </a:extLst>
           </p:cNvPr>
@@ -8844,17 +9336,17 @@
           <a:p>
             <a:r>
               <a:rPr lang="en-US" dirty="0"/>
-              <a:t>Appendix &amp; references</a:t>
+              <a:t>summary</a:t>
             </a:r>
           </a:p>
         </p:txBody>
       </p:sp>
       <p:sp>
         <p:nvSpPr>
-          <p:cNvPr id="8" name="Text Placeholder 7">
+          <p:cNvPr id="3" name="Content Placeholder 2">
             <a:extLst>
               <a:ext uri="{FF2B5EF4-FFF2-40B4-BE49-F238E27FC236}">
-                <a16:creationId xmlns:a16="http://schemas.microsoft.com/office/drawing/2014/main" id="{D1FB7F40-7669-4C05-B313-AB3C41751B01}"/>
+                <a16:creationId xmlns:a16="http://schemas.microsoft.com/office/drawing/2014/main" id="{F360DE0A-E8ED-4A6D-84CE-7782113F379C}"/>
               </a:ext>
             </a:extLst>
           </p:cNvPr>
@@ -8862,7 +9354,7 @@
             <a:spLocks noGrp="1"/>
           </p:cNvSpPr>
           <p:nvPr>
-            <p:ph type="body" idx="1"/>
+            <p:ph idx="1"/>
           </p:nvPr>
         </p:nvSpPr>
         <p:spPr/>
@@ -8877,7 +9369,7 @@
     </p:spTree>
     <p:extLst>
       <p:ext uri="{BB962C8B-B14F-4D97-AF65-F5344CB8AC3E}">
-        <p14:creationId xmlns:p14="http://schemas.microsoft.com/office/powerpoint/2010/main" val="3623446405"/>
+        <p14:creationId xmlns:p14="http://schemas.microsoft.com/office/powerpoint/2010/main" val="3981026224"/>
       </p:ext>
     </p:extLst>
   </p:cSld>

</xml_diff>